<commit_message>
Remove edge impulse logo for now
</commit_message>
<xml_diff>
--- a/splash/openmv-splash-slate/splash.pptx
+++ b/splash/openmv-splash-slate/splash.pptx
@@ -303,7 +303,7 @@
             <a:fld id="{1D8BD707-D9CF-40AE-B4C6-C98DA3205C09}" type="datetimeFigureOut">
               <a:rPr lang="en-US" smtClean="0"/>
               <a:pPr/>
-              <a:t>10/4/2020</a:t>
+              <a:t>10/5/2020</a:t>
             </a:fld>
             <a:endParaRPr lang="en-US"/>
           </a:p>
@@ -468,7 +468,7 @@
             <a:fld id="{1D8BD707-D9CF-40AE-B4C6-C98DA3205C09}" type="datetimeFigureOut">
               <a:rPr lang="en-US" smtClean="0"/>
               <a:pPr/>
-              <a:t>10/4/2020</a:t>
+              <a:t>10/5/2020</a:t>
             </a:fld>
             <a:endParaRPr lang="en-US"/>
           </a:p>
@@ -643,7 +643,7 @@
             <a:fld id="{1D8BD707-D9CF-40AE-B4C6-C98DA3205C09}" type="datetimeFigureOut">
               <a:rPr lang="en-US" smtClean="0"/>
               <a:pPr/>
-              <a:t>10/4/2020</a:t>
+              <a:t>10/5/2020</a:t>
             </a:fld>
             <a:endParaRPr lang="en-US"/>
           </a:p>
@@ -808,7 +808,7 @@
             <a:fld id="{1D8BD707-D9CF-40AE-B4C6-C98DA3205C09}" type="datetimeFigureOut">
               <a:rPr lang="en-US" smtClean="0"/>
               <a:pPr/>
-              <a:t>10/4/2020</a:t>
+              <a:t>10/5/2020</a:t>
             </a:fld>
             <a:endParaRPr lang="en-US"/>
           </a:p>
@@ -1050,7 +1050,7 @@
             <a:fld id="{1D8BD707-D9CF-40AE-B4C6-C98DA3205C09}" type="datetimeFigureOut">
               <a:rPr lang="en-US" smtClean="0"/>
               <a:pPr/>
-              <a:t>10/4/2020</a:t>
+              <a:t>10/5/2020</a:t>
             </a:fld>
             <a:endParaRPr lang="en-US"/>
           </a:p>
@@ -1332,7 +1332,7 @@
             <a:fld id="{1D8BD707-D9CF-40AE-B4C6-C98DA3205C09}" type="datetimeFigureOut">
               <a:rPr lang="en-US" smtClean="0"/>
               <a:pPr/>
-              <a:t>10/4/2020</a:t>
+              <a:t>10/5/2020</a:t>
             </a:fld>
             <a:endParaRPr lang="en-US"/>
           </a:p>
@@ -1748,7 +1748,7 @@
             <a:fld id="{1D8BD707-D9CF-40AE-B4C6-C98DA3205C09}" type="datetimeFigureOut">
               <a:rPr lang="en-US" smtClean="0"/>
               <a:pPr/>
-              <a:t>10/4/2020</a:t>
+              <a:t>10/5/2020</a:t>
             </a:fld>
             <a:endParaRPr lang="en-US"/>
           </a:p>
@@ -1862,7 +1862,7 @@
             <a:fld id="{1D8BD707-D9CF-40AE-B4C6-C98DA3205C09}" type="datetimeFigureOut">
               <a:rPr lang="en-US" smtClean="0"/>
               <a:pPr/>
-              <a:t>10/4/2020</a:t>
+              <a:t>10/5/2020</a:t>
             </a:fld>
             <a:endParaRPr lang="en-US"/>
           </a:p>
@@ -1954,7 +1954,7 @@
             <a:fld id="{1D8BD707-D9CF-40AE-B4C6-C98DA3205C09}" type="datetimeFigureOut">
               <a:rPr lang="en-US" smtClean="0"/>
               <a:pPr/>
-              <a:t>10/4/2020</a:t>
+              <a:t>10/5/2020</a:t>
             </a:fld>
             <a:endParaRPr lang="en-US"/>
           </a:p>
@@ -2226,7 +2226,7 @@
             <a:fld id="{1D8BD707-D9CF-40AE-B4C6-C98DA3205C09}" type="datetimeFigureOut">
               <a:rPr lang="en-US" smtClean="0"/>
               <a:pPr/>
-              <a:t>10/4/2020</a:t>
+              <a:t>10/5/2020</a:t>
             </a:fld>
             <a:endParaRPr lang="en-US"/>
           </a:p>
@@ -2475,7 +2475,7 @@
             <a:fld id="{1D8BD707-D9CF-40AE-B4C6-C98DA3205C09}" type="datetimeFigureOut">
               <a:rPr lang="en-US" smtClean="0"/>
               <a:pPr/>
-              <a:t>10/4/2020</a:t>
+              <a:t>10/5/2020</a:t>
             </a:fld>
             <a:endParaRPr lang="en-US"/>
           </a:p>
@@ -2683,7 +2683,7 @@
             <a:fld id="{1D8BD707-D9CF-40AE-B4C6-C98DA3205C09}" type="datetimeFigureOut">
               <a:rPr lang="en-US" smtClean="0"/>
               <a:pPr/>
-              <a:t>10/4/2020</a:t>
+              <a:t>10/5/2020</a:t>
             </a:fld>
             <a:endParaRPr lang="en-US"/>
           </a:p>
@@ -3415,44 +3415,8 @@
           </p:blipFill>
           <p:spPr>
             <a:xfrm>
-              <a:off x="1509346" y="19530030"/>
+              <a:off x="11661916" y="19530030"/>
               <a:ext cx="13252168" cy="3657600"/>
-            </a:xfrm>
-            <a:prstGeom prst="rect">
-              <a:avLst/>
-            </a:prstGeom>
-          </p:spPr>
-        </p:pic>
-        <p:pic>
-          <p:nvPicPr>
-            <p:cNvPr id="23" name="Picture 22" descr="A picture containing drawing&#10;&#10;Description automatically generated">
-              <a:extLst>
-                <a:ext uri="{FF2B5EF4-FFF2-40B4-BE49-F238E27FC236}">
-                  <a16:creationId xmlns:a16="http://schemas.microsoft.com/office/drawing/2014/main" id="{FBE33522-FE02-4694-861E-07977313F11D}"/>
-                </a:ext>
-              </a:extLst>
-            </p:cNvPr>
-            <p:cNvPicPr>
-              <a:picLocks noChangeAspect="1"/>
-            </p:cNvPicPr>
-            <p:nvPr/>
-          </p:nvPicPr>
-          <p:blipFill>
-            <a:blip r:embed="rId4">
-              <a:extLst>
-                <a:ext uri="{28A0092B-C50C-407E-A947-70E740481C1C}">
-                  <a14:useLocalDpi xmlns:a14="http://schemas.microsoft.com/office/drawing/2010/main" val="0"/>
-                </a:ext>
-              </a:extLst>
-            </a:blip>
-            <a:stretch>
-              <a:fillRect/>
-            </a:stretch>
-          </p:blipFill>
-          <p:spPr>
-            <a:xfrm>
-              <a:off x="16270860" y="19910843"/>
-              <a:ext cx="17167977" cy="2895974"/>
             </a:xfrm>
             <a:prstGeom prst="rect">
               <a:avLst/>

</xml_diff>